<commit_message>
#15 RooCode interpreting stryker html report
</commit_message>
<xml_diff>
--- a/_spikes/stryker-playground/Stryker-demo.pptx
+++ b/_spikes/stryker-playground/Stryker-demo.pptx
@@ -6,7 +6,9 @@
   </p:sldMasterIdLst>
   <p:sldIdLst>
     <p:sldId id="256" r:id="rId2"/>
-    <p:sldId id="257" r:id="rId3"/>
+    <p:sldId id="258" r:id="rId3"/>
+    <p:sldId id="257" r:id="rId4"/>
+    <p:sldId id="259" r:id="rId5"/>
   </p:sldIdLst>
   <p:sldSz cx="12192000" cy="6858000"/>
   <p:notesSz cx="6858000" cy="9144000"/>
@@ -105,6 +107,11 @@
       </a:defRPr>
     </a:lvl9pPr>
   </p:defaultTextStyle>
+  <p:extLst>
+    <p:ext uri="{EFAFB233-063F-42B5-8137-9DF3F51BA10A}">
+      <p15:sldGuideLst xmlns:p15="http://schemas.microsoft.com/office/powerpoint/2012/main"/>
+    </p:ext>
+  </p:extLst>
 </p:presentation>
 </file>
 
@@ -133,6 +140,174 @@
     </inkml:brush>
   </inkml:definitions>
   <inkml:trace contextRef="#ctx0" brushRef="#br0">1 1 24575,'40'0'0,"-10"0"0,48 0 0,-25 0 0,18 0 0,-1 0 0,-17 0 0,15 0 0,-26 5 0,-2-3 0,-10 4 0,-7-1 0,-7-4 0,5 4 0,-10-5 0,4 0 0,-6 0 0,1 0 0,-1 0 0,0 0 0,-1 0 0,1 0 0,0 0 0,0 0 0,0 0 0,0 0 0,0 0 0,-1 0 0,-7 0 0,2 0 0,-7 0 0</inkml:trace>
+</inkml:ink>
+</file>
+
+<file path=ppt/ink/ink2.xml><?xml version="1.0" encoding="utf-8"?>
+<inkml:ink xmlns:inkml="http://www.w3.org/2003/InkML">
+  <inkml:definitions>
+    <inkml:context xml:id="ctx0">
+      <inkml:inkSource xml:id="inkSrc0">
+        <inkml:traceFormat>
+          <inkml:channel name="X" type="integer" min="-2.14748E9" max="2.14748E9" units="cm"/>
+          <inkml:channel name="Y" type="integer" min="-2.14748E9" max="2.14748E9" units="cm"/>
+          <inkml:channel name="F" type="integer" max="32767" units="dev"/>
+        </inkml:traceFormat>
+        <inkml:channelProperties>
+          <inkml:channelProperty channel="X" name="resolution" value="1000" units="1/cm"/>
+          <inkml:channelProperty channel="Y" name="resolution" value="1000" units="1/cm"/>
+          <inkml:channelProperty channel="F" name="resolution" value="0" units="1/dev"/>
+        </inkml:channelProperties>
+      </inkml:inkSource>
+      <inkml:timestamp xml:id="ts0" timeString="2025-11-03T17:59:18.203"/>
+    </inkml:context>
+    <inkml:brush xml:id="br0">
+      <inkml:brushProperty name="width" value="0.05" units="cm"/>
+      <inkml:brushProperty name="height" value="0.05" units="cm"/>
+      <inkml:brushProperty name="color" value="#66CC00"/>
+    </inkml:brush>
+  </inkml:definitions>
+  <inkml:trace contextRef="#ctx0" brushRef="#br0">1 79 16324,'7'0'0,"19"0"3597,25 0-3597,37 0 0,-15 0 0,10 0-1914,5 0 1,9 0 0,0 0 1913,-9 0 0,0 0 0,2 0 0,-13 0 0,2 0 0,1 0 0,-1 0-222,0 0 0,1 0 0,-1 0 0,-1 0 222,17 0 0,-2 0 0,4 0 0,-11 0 0,3 0 0,1 0 0,-1 0 0,-6 0 0,-1 0 0,0 0 0,-2 0 0,18 3 0,-1 1 0,-5 0-18,-20-1 0,-4 0 1,0 1 17,4 2 0,0 2 0,-6-1-323,1 2 1,-2 0 322,12 1 0,0-1 0,-13-3 0,-3-1 1933,-6 3 0,-2-1-1933,43-6 0,-36 3 0,1-1 0,-10-2 0,0-2 0,10 1 0,0 0 0,34 0 0,-40 0 0,-2 0 0,36 0 0,-37 1 0,1-2 0,44-6 0,-42 2 0,1 0 0,0-4 0,-1 1 0,42-2 0,-14-3 0,-11 11 3820,-9-4-3820,-3 6 2335,-16 0-2335,5-6 1405,-13 5-1405,13-5 554,-14 6-554,7 0 0,-1-6 0,-5 5 0,13-5 0,-13 6 0,-1-4 0,-3 3 0,-5-4 0,7 5 0,-7 0 0,-1 0 0,0 0 0,-5 0 0,4-4 0,1 3 0,-5-3 0,11 4 0,-5-6 0,7 5 0,7-4 0,-5 0 0,5 4 0,1-4 0,-6 5 0,13 0 0,-14-5 0,7 4 0,-1-4 0,-5 5 0,6 0 0,-9 0 0,1-5 0,-7 3 0,5-3 0,-4 5 0,5 0 0,1 0 0,0 0 0,7 0 0,3-5 0,7 3 0,9-4 0,-6 6 0,15-6 0,-15 4 0,6-4 0,-8 6 0,-9 0 0,-1 0 0,-9 0 0,-5 0 0,-3 0 0,-10 0 0,-2 0 0,-5 0 0,0-4 0,0 3 0,0-2 0,0 3 0,-4 0 0,-1 0 0</inkml:trace>
+</inkml:ink>
+</file>
+
+<file path=ppt/ink/ink3.xml><?xml version="1.0" encoding="utf-8"?>
+<inkml:ink xmlns:inkml="http://www.w3.org/2003/InkML">
+  <inkml:definitions>
+    <inkml:context xml:id="ctx0">
+      <inkml:inkSource xml:id="inkSrc0">
+        <inkml:traceFormat>
+          <inkml:channel name="X" type="integer" min="-2.14748E9" max="2.14748E9" units="cm"/>
+          <inkml:channel name="Y" type="integer" min="-2.14748E9" max="2.14748E9" units="cm"/>
+          <inkml:channel name="F" type="integer" max="32767" units="dev"/>
+        </inkml:traceFormat>
+        <inkml:channelProperties>
+          <inkml:channelProperty channel="X" name="resolution" value="1000" units="1/cm"/>
+          <inkml:channelProperty channel="Y" name="resolution" value="1000" units="1/cm"/>
+          <inkml:channelProperty channel="F" name="resolution" value="0" units="1/dev"/>
+        </inkml:channelProperties>
+      </inkml:inkSource>
+      <inkml:timestamp xml:id="ts0" timeString="2025-11-03T17:59:20.479"/>
+    </inkml:context>
+    <inkml:brush xml:id="br0">
+      <inkml:brushProperty name="width" value="0.05" units="cm"/>
+      <inkml:brushProperty name="height" value="0.05" units="cm"/>
+      <inkml:brushProperty name="color" value="#66CC00"/>
+    </inkml:brush>
+  </inkml:definitions>
+  <inkml:trace contextRef="#ctx0" brushRef="#br0">0 0 24575,'59'0'0,"25"0"0,-3 0 0,9 0-1140,-17 0 1,4 0-1,2 0 1140,14 0 0,4 0 0,3 0-1441,-14 0 0,2 0 1,1 0-1,2 0 1441,-11 0 0,0 0 0,2 0 0,-1 0 0,0 0 0,17 0 0,0 0 0,-2 0 0,-2 0 0,-11 0 0,-2 0 0,-1 0 0,0 0-329,4 0 0,1 0 1,-1 0-1,-2 0 329,12 0 0,-3 0 0,2 0-542,-16 0 1,2 0 0,0 0 0,-1 0 541,-1 0 0,0 0 0,-1 0 0,-3 0-223,11 0 0,-3 0 0,0 0 223,-1 0 0,1 0 0,-1 0 0,-5 0 0,-1 0 0,0 0 0,-5 0 0,0 0 0,0 0 0,5 0 0,0 0 0,-3 0 887,17 0 1,0 0-888,-17 0 0,3 0 0,-3 0 0,17 0 0,0 0 0,-16 0 0,3 0 0,-3 0 0,16 0 0,0 0 0,12 0 0,-1 0 0,-19 0 0,-3 0 883,-12 0 0,2 0-883,23 0 0,-5 0 2223,4 0-2223,-8 0 0,0 0 0,7 0 0,-34 0 0,0 0 0,42 0 2136,0 0-2136,-11 7 0,8-6 0,-18 6 0,8-7 2057,-11 6-2057,0-4 1647,0 4-1647,0-6 0,10 0 0,-7 6 240,-16-1 0,1 0-240,11 4 0,-14-1 0,3 0 0,-2-3 0,0 1 0,-5-2 0,0 1 0,10 0 0,0-1 0,-2 1 0,-4-1 0,24-2 0,-22 5 0,1 1 0,37-6 0,2 5 0,-1-7 0,-5 0 0,-18 0 0,7 0 539,-19 0-539,7 0 97,-17 0-97,17 0 0,-17 0 0,17 0 0,-7 0 0,-9 0 0,0 0 0,10 0 0,-7 0 0,0 0 0,12 0 0,26 0 0,-9 0 0,7 0 0,-18 0 0,7 0 611,-19 0-611,7 0 0,-17 0 0,8 0 0,-1 0 0,-6 0 0,15 0 0,-6-6 0,0 4 0,6-4 0,-6-1 0,0 6 0,-3-11 0,-8 10 0,-1-4 0,0 6 0,-7-5 0,-3 4 0,-7-4 0,7 5 0,-5 0 0,5 0 0,1 0 0,-7 0 0,15 0 0,-15 0 0,15 0 0,-7 0 0,0 0 0,7 0 0,-7 0 0,8 0 0,1 6 0,-1-5 0,0 11 0,0-11 0,1 5 0,-9-1 0,6-4 0,-13 4 0,5-5 0,-7 0 0,0 5 0,-1-4 0,-5 8 0,4-3 0,-11 0 0,4-1 0,-5-1 0,-6-3 0,4 8 0,-9-8 0,4 3 0,-8-4 0,-2 0 0</inkml:trace>
+</inkml:ink>
+</file>
+
+<file path=ppt/ink/ink4.xml><?xml version="1.0" encoding="utf-8"?>
+<inkml:ink xmlns:inkml="http://www.w3.org/2003/InkML">
+  <inkml:definitions>
+    <inkml:context xml:id="ctx0">
+      <inkml:inkSource xml:id="inkSrc0">
+        <inkml:traceFormat>
+          <inkml:channel name="X" type="integer" min="-2.14748E9" max="2.14748E9" units="cm"/>
+          <inkml:channel name="Y" type="integer" min="-2.14748E9" max="2.14748E9" units="cm"/>
+          <inkml:channel name="F" type="integer" max="32767" units="dev"/>
+        </inkml:traceFormat>
+        <inkml:channelProperties>
+          <inkml:channelProperty channel="X" name="resolution" value="1000" units="1/cm"/>
+          <inkml:channelProperty channel="Y" name="resolution" value="1000" units="1/cm"/>
+          <inkml:channelProperty channel="F" name="resolution" value="0" units="1/dev"/>
+        </inkml:channelProperties>
+      </inkml:inkSource>
+      <inkml:timestamp xml:id="ts0" timeString="2025-11-03T17:59:24.742"/>
+    </inkml:context>
+    <inkml:brush xml:id="br0">
+      <inkml:brushProperty name="width" value="0.05" units="cm"/>
+      <inkml:brushProperty name="height" value="0.05" units="cm"/>
+      <inkml:brushProperty name="color" value="#66CC00"/>
+    </inkml:brush>
+  </inkml:definitions>
+  <inkml:trace contextRef="#ctx0" brushRef="#br0">0 7193 24575,'0'-80'0,"0"-1"0,3 9 0,1-5 0,2-4 0,0 4 0,0-5 0,1-2 0,0 4-2278,-2-15 1,-1 2 0,5 0 2277,9-5 0,3 1 0,-3 2 0,-11 15 0,-2 1 0,3 0 0,9-10 0,4-2 0,-3 1 0,-7 2 0,-4 0 0,1 4 0,3 12 1,1 3 0,-3 3-1,-2-12 0,-2 4 0,4-2 0,-1 6 389,-6-18-389,6 6 0,2-1 0,-2 28 0,0 0 0,-1-34 0,0 0 0,4 31 0,0 1 0,-1-17 0,-1-2 0,0 7 0,2-2-766,8-12 1,0-2 765,-8 0 0,0-2 0,9-8 0,-1 3 0,-9 23 0,1 3 1044,6-9 1,1 4-1045,-1-18 644,-5 40 1,0 1-645,3-26 1209,-3 22-1209,-1 17 2093,0 9-2093,-2 11 953,-4 2-953,4-14 339,14-25-339,1-14 0,11-7 0,0 3 0,-6 7-778,3 8 1,5-4 777,-4 4 0,0 0 0,2-6 0,0 1-307,3 7 0,-2 3 307,3-23-15,14 4 15,-20 16 0,4 13 0,-13 8 1503,19-8-1503,-1 0 664,-2 5-664,5-3 17,-17 20-17,32-41 0,0 11 0,3-8 0,2-1 0,-27 24 0,9-15 0,-17 18 0,-2 7 0,-13 5 0,-2 7 0,-4-2 0,-5 5 0,0 0 0,-4 0 0,0 0 0,5-11 0,9-20 0,22-19 0,-5-6 0,22-20 0,-27 33 0,-1 0 0,14-23 0,-10 21 0,-2 2 0,1-4 0,4-1 0,-7 6 0,-8 22 0,-2 2 0,-6 12 0,-4 1 0,-1 6 0,-4 0 0,0 0 0,0 3 0,0 1 0</inkml:trace>
+</inkml:ink>
+</file>
+
+<file path=ppt/ink/ink5.xml><?xml version="1.0" encoding="utf-8"?>
+<inkml:ink xmlns:inkml="http://www.w3.org/2003/InkML">
+  <inkml:definitions>
+    <inkml:context xml:id="ctx0">
+      <inkml:inkSource xml:id="inkSrc0">
+        <inkml:traceFormat>
+          <inkml:channel name="X" type="integer" min="-2.14748E9" max="2.14748E9" units="cm"/>
+          <inkml:channel name="Y" type="integer" min="-2.14748E9" max="2.14748E9" units="cm"/>
+          <inkml:channel name="F" type="integer" max="32767" units="dev"/>
+        </inkml:traceFormat>
+        <inkml:channelProperties>
+          <inkml:channelProperty channel="X" name="resolution" value="1000" units="1/cm"/>
+          <inkml:channelProperty channel="Y" name="resolution" value="1000" units="1/cm"/>
+          <inkml:channelProperty channel="F" name="resolution" value="0" units="1/dev"/>
+        </inkml:channelProperties>
+      </inkml:inkSource>
+      <inkml:timestamp xml:id="ts0" timeString="2025-11-03T17:59:27.314"/>
+    </inkml:context>
+    <inkml:brush xml:id="br0">
+      <inkml:brushProperty name="width" value="0.05" units="cm"/>
+      <inkml:brushProperty name="height" value="0.05" units="cm"/>
+      <inkml:brushProperty name="color" value="#66CC00"/>
+    </inkml:brush>
+  </inkml:definitions>
+  <inkml:trace contextRef="#ctx0" brushRef="#br0">1 1 24575,'12'0'0,"2"0"0,5 0 0,7 0 0,-6 0 0,6 4 0,-7-3 0,1 8 0,-6-8 0,-1 7 0,-5-7 0,0 6 0,0-6 0,-4 5 0,3-5 0,-3 3 0,4-1 0,-1-2 0,1 2 0,0-3 0,-1 3 0,1-2 0,0 6 0,-1-6 0,0 2 0,0 1 0,0-3 0,1 2 0,0-3 0,0 4 0,0-3 0,-4 6 0,0-3 0,-4 3 0,0 0 0,0 0 0,-4-3 0,0 2 0,-4-2 0,1 4 0,2-1 0,-1-3 0,1 4 0,0-4 0,-2 1 0,3 2 0,-5-3 0,1 1 0,4 2 0,-4-3 0,4 1 0,-4 2 0,3-2 0,-2-1 0,6 3 0,-3-3 0,1 1 0,2 2 0,-3-3 0,4 4 0,-4-4 0,4 3 0,-4-3 0,4 3 0,0 0 0,0 0 0,0 0 0,0 0 0,0 0 0,0 0 0,0 1 0,0-1 0,0 0 0,0 0 0,0 1 0,0-1 0,0 1 0,0 0 0,0-1 0,0 1 0,0-1 0,0 1 0,0-1 0,0 0 0,3-3 0,-2-1 0,1-3 0</inkml:trace>
+</inkml:ink>
+</file>
+
+<file path=ppt/ink/ink6.xml><?xml version="1.0" encoding="utf-8"?>
+<inkml:ink xmlns:inkml="http://www.w3.org/2003/InkML">
+  <inkml:definitions>
+    <inkml:context xml:id="ctx0">
+      <inkml:inkSource xml:id="inkSrc0">
+        <inkml:traceFormat>
+          <inkml:channel name="X" type="integer" min="-2.14748E9" max="2.14748E9" units="cm"/>
+          <inkml:channel name="Y" type="integer" min="-2.14748E9" max="2.14748E9" units="cm"/>
+          <inkml:channel name="F" type="integer" max="32767" units="dev"/>
+        </inkml:traceFormat>
+        <inkml:channelProperties>
+          <inkml:channelProperty channel="X" name="resolution" value="1000" units="1/cm"/>
+          <inkml:channelProperty channel="Y" name="resolution" value="1000" units="1/cm"/>
+          <inkml:channelProperty channel="F" name="resolution" value="0" units="1/dev"/>
+        </inkml:channelProperties>
+      </inkml:inkSource>
+      <inkml:timestamp xml:id="ts0" timeString="2025-11-03T18:09:22.360"/>
+    </inkml:context>
+    <inkml:brush xml:id="br0">
+      <inkml:brushProperty name="width" value="0.05" units="cm"/>
+      <inkml:brushProperty name="height" value="0.05" units="cm"/>
+      <inkml:brushProperty name="color" value="#66CC00"/>
+    </inkml:brush>
+  </inkml:definitions>
+  <inkml:trace contextRef="#ctx0" brushRef="#br0">1 0 24575,'0'0'0</inkml:trace>
+</inkml:ink>
+</file>
+
+<file path=ppt/ink/ink7.xml><?xml version="1.0" encoding="utf-8"?>
+<inkml:ink xmlns:inkml="http://www.w3.org/2003/InkML">
+  <inkml:definitions>
+    <inkml:context xml:id="ctx0">
+      <inkml:inkSource xml:id="inkSrc0">
+        <inkml:traceFormat>
+          <inkml:channel name="X" type="integer" min="-2.14748E9" max="2.14748E9" units="cm"/>
+          <inkml:channel name="Y" type="integer" min="-2.14748E9" max="2.14748E9" units="cm"/>
+          <inkml:channel name="F" type="integer" max="32767" units="dev"/>
+        </inkml:traceFormat>
+        <inkml:channelProperties>
+          <inkml:channelProperty channel="X" name="resolution" value="1000" units="1/cm"/>
+          <inkml:channelProperty channel="Y" name="resolution" value="1000" units="1/cm"/>
+          <inkml:channelProperty channel="F" name="resolution" value="0" units="1/dev"/>
+        </inkml:channelProperties>
+      </inkml:inkSource>
+      <inkml:timestamp xml:id="ts0" timeString="2025-11-03T18:09:23.241"/>
+    </inkml:context>
+    <inkml:brush xml:id="br0">
+      <inkml:brushProperty name="width" value="0.05" units="cm"/>
+      <inkml:brushProperty name="height" value="0.05" units="cm"/>
+      <inkml:brushProperty name="color" value="#66CC00"/>
+    </inkml:brush>
+  </inkml:definitions>
+  <inkml:trace contextRef="#ctx0" brushRef="#br0">0 1 24575,'0'0'0</inkml:trace>
 </inkml:ink>
 </file>
 
@@ -3482,6 +3657,98 @@
           <a:chExt cx="0" cy="0"/>
         </a:xfrm>
       </p:grpSpPr>
+      <p:sp>
+        <p:nvSpPr>
+          <p:cNvPr id="2" name="Title 1">
+            <a:extLst>
+              <a:ext uri="{FF2B5EF4-FFF2-40B4-BE49-F238E27FC236}">
+                <a16:creationId xmlns:a16="http://schemas.microsoft.com/office/drawing/2014/main" id="{3A981591-11AC-13A6-9DA0-212A801C0E00}"/>
+              </a:ext>
+            </a:extLst>
+          </p:cNvPr>
+          <p:cNvSpPr>
+            <a:spLocks noGrp="1"/>
+          </p:cNvSpPr>
+          <p:nvPr>
+            <p:ph type="title"/>
+          </p:nvPr>
+        </p:nvSpPr>
+        <p:spPr/>
+        <p:txBody>
+          <a:bodyPr/>
+          <a:lstStyle/>
+          <a:p>
+            <a:r>
+              <a:rPr lang="en-SK" dirty="0"/>
+              <a:t>Surviving Mutant	</a:t>
+            </a:r>
+          </a:p>
+        </p:txBody>
+      </p:sp>
+      <p:sp>
+        <p:nvSpPr>
+          <p:cNvPr id="3" name="Content Placeholder 2">
+            <a:extLst>
+              <a:ext uri="{FF2B5EF4-FFF2-40B4-BE49-F238E27FC236}">
+                <a16:creationId xmlns:a16="http://schemas.microsoft.com/office/drawing/2014/main" id="{A8F0F37E-9238-0BF7-0764-E17ED08AC338}"/>
+              </a:ext>
+            </a:extLst>
+          </p:cNvPr>
+          <p:cNvSpPr>
+            <a:spLocks noGrp="1"/>
+          </p:cNvSpPr>
+          <p:nvPr>
+            <p:ph idx="1"/>
+          </p:nvPr>
+        </p:nvSpPr>
+        <p:spPr/>
+        <p:txBody>
+          <a:bodyPr/>
+          <a:lstStyle/>
+          <a:p>
+            <a:r>
+              <a:rPr lang="en-SK" dirty="0"/>
+              <a:t>1) Kod je nanic a obsahuje nepodstatny balast</a:t>
+            </a:r>
+          </a:p>
+          <a:p>
+            <a:r>
+              <a:rPr lang="en-SK" dirty="0"/>
+              <a:t>2) test je nanic a nepokryva podstatnu cast kodu</a:t>
+            </a:r>
+          </a:p>
+        </p:txBody>
+      </p:sp>
+    </p:spTree>
+    <p:extLst>
+      <p:ext uri="{BB962C8B-B14F-4D97-AF65-F5344CB8AC3E}">
+        <p14:creationId xmlns:p14="http://schemas.microsoft.com/office/powerpoint/2010/main" val="1674365757"/>
+      </p:ext>
+    </p:extLst>
+  </p:cSld>
+  <p:clrMapOvr>
+    <a:masterClrMapping/>
+  </p:clrMapOvr>
+</p:sld>
+</file>
+
+<file path=ppt/slides/slide3.xml><?xml version="1.0" encoding="utf-8"?>
+<p:sld xmlns:a="http://schemas.openxmlformats.org/drawingml/2006/main" xmlns:r="http://schemas.openxmlformats.org/officeDocument/2006/relationships" xmlns:p="http://schemas.openxmlformats.org/presentationml/2006/main">
+  <p:cSld>
+    <p:spTree>
+      <p:nvGrpSpPr>
+        <p:cNvPr id="1" name=""/>
+        <p:cNvGrpSpPr/>
+        <p:nvPr/>
+      </p:nvGrpSpPr>
+      <p:grpSpPr>
+        <a:xfrm>
+          <a:off x="0" y="0"/>
+          <a:ext cx="0" cy="0"/>
+          <a:chOff x="0" y="0"/>
+          <a:chExt cx="0" cy="0"/>
+        </a:xfrm>
+      </p:grpSpPr>
       <p:pic>
         <p:nvPicPr>
           <p:cNvPr id="4" name="Picture 3">
@@ -3534,7 +3801,7 @@
         </p:blipFill>
         <p:spPr>
           <a:xfrm>
-            <a:off x="430428" y="328603"/>
+            <a:off x="430428" y="626315"/>
             <a:ext cx="7772400" cy="1494306"/>
           </a:xfrm>
           <a:prstGeom prst="rect">
@@ -3602,8 +3869,8 @@
           </a:prstGeom>
         </p:spPr>
       </p:pic>
-      <mc:AlternateContent xmlns:mc="http://schemas.openxmlformats.org/markup-compatibility/2006">
-        <mc:Choice xmlns:p14="http://schemas.microsoft.com/office/powerpoint/2010/main" Requires="p14">
+      <mc:AlternateContent xmlns:mc="http://schemas.openxmlformats.org/markup-compatibility/2006" xmlns:p14="http://schemas.microsoft.com/office/powerpoint/2010/main">
+        <mc:Choice Requires="p14">
           <p:contentPart p14:bwMode="auto" r:id="rId6">
             <p14:nvContentPartPr>
               <p14:cNvPr id="8" name="Ink 7">
@@ -3622,7 +3889,7 @@
             </p14:xfrm>
           </p:contentPart>
         </mc:Choice>
-        <mc:Fallback>
+        <mc:Fallback xmlns="">
           <p:pic>
             <p:nvPicPr>
               <p:cNvPr id="8" name="Ink 7">
@@ -3653,10 +3920,490 @@
           </p:pic>
         </mc:Fallback>
       </mc:AlternateContent>
+      <p:sp>
+        <p:nvSpPr>
+          <p:cNvPr id="2" name="Title 1">
+            <a:extLst>
+              <a:ext uri="{FF2B5EF4-FFF2-40B4-BE49-F238E27FC236}">
+                <a16:creationId xmlns:a16="http://schemas.microsoft.com/office/drawing/2014/main" id="{3813554D-CC1F-14B0-C085-BF6C024E64E6}"/>
+              </a:ext>
+            </a:extLst>
+          </p:cNvPr>
+          <p:cNvSpPr>
+            <a:spLocks noGrp="1"/>
+          </p:cNvSpPr>
+          <p:nvPr>
+            <p:ph type="title"/>
+          </p:nvPr>
+        </p:nvSpPr>
+        <p:spPr>
+          <a:xfrm>
+            <a:off x="306572" y="106325"/>
+            <a:ext cx="6349409" cy="405718"/>
+          </a:xfrm>
+        </p:spPr>
+        <p:txBody>
+          <a:bodyPr>
+            <a:normAutofit fontScale="90000"/>
+          </a:bodyPr>
+          <a:lstStyle/>
+          <a:p>
+            <a:r>
+              <a:rPr lang="en-SK" dirty="0"/>
+              <a:t>Sample1</a:t>
+            </a:r>
+          </a:p>
+        </p:txBody>
+      </p:sp>
+      <mc:AlternateContent xmlns:mc="http://schemas.openxmlformats.org/markup-compatibility/2006">
+        <mc:Choice xmlns:p14="http://schemas.microsoft.com/office/powerpoint/2010/main" Requires="p14">
+          <p:contentPart p14:bwMode="auto" r:id="rId8">
+            <p14:nvContentPartPr>
+              <p14:cNvPr id="3" name="Ink 2">
+                <a:extLst>
+                  <a:ext uri="{FF2B5EF4-FFF2-40B4-BE49-F238E27FC236}">
+                    <a16:creationId xmlns:a16="http://schemas.microsoft.com/office/drawing/2014/main" id="{F4B3ABDA-A9D1-71AE-03C3-158F23EE37A7}"/>
+                  </a:ext>
+                </a:extLst>
+              </p14:cNvPr>
+              <p14:cNvContentPartPr/>
+              <p14:nvPr/>
+            </p14:nvContentPartPr>
+            <p14:xfrm>
+              <a:off x="2794504" y="5417891"/>
+              <a:ext cx="2688120" cy="69480"/>
+            </p14:xfrm>
+          </p:contentPart>
+        </mc:Choice>
+        <mc:Fallback>
+          <p:pic>
+            <p:nvPicPr>
+              <p:cNvPr id="3" name="Ink 2">
+                <a:extLst>
+                  <a:ext uri="{FF2B5EF4-FFF2-40B4-BE49-F238E27FC236}">
+                    <a16:creationId xmlns:a16="http://schemas.microsoft.com/office/drawing/2014/main" id="{F4B3ABDA-A9D1-71AE-03C3-158F23EE37A7}"/>
+                  </a:ext>
+                </a:extLst>
+              </p:cNvPr>
+              <p:cNvPicPr/>
+              <p:nvPr/>
+            </p:nvPicPr>
+            <p:blipFill>
+              <a:blip r:embed="rId9"/>
+              <a:stretch>
+                <a:fillRect/>
+              </a:stretch>
+            </p:blipFill>
+            <p:spPr>
+              <a:xfrm>
+                <a:off x="2785864" y="5409251"/>
+                <a:ext cx="2705760" cy="87120"/>
+              </a:xfrm>
+              <a:prstGeom prst="rect">
+                <a:avLst/>
+              </a:prstGeom>
+            </p:spPr>
+          </p:pic>
+        </mc:Fallback>
+      </mc:AlternateContent>
+      <mc:AlternateContent xmlns:mc="http://schemas.openxmlformats.org/markup-compatibility/2006">
+        <mc:Choice xmlns:p14="http://schemas.microsoft.com/office/powerpoint/2010/main" Requires="p14">
+          <p:contentPart p14:bwMode="auto" r:id="rId10">
+            <p14:nvContentPartPr>
+              <p14:cNvPr id="9" name="Ink 8">
+                <a:extLst>
+                  <a:ext uri="{FF2B5EF4-FFF2-40B4-BE49-F238E27FC236}">
+                    <a16:creationId xmlns:a16="http://schemas.microsoft.com/office/drawing/2014/main" id="{BDED0134-4FC0-23F3-B891-DC34C9A292A9}"/>
+                  </a:ext>
+                </a:extLst>
+              </p14:cNvPr>
+              <p14:cNvContentPartPr/>
+              <p14:nvPr/>
+            </p14:nvContentPartPr>
+            <p14:xfrm>
+              <a:off x="651424" y="5597891"/>
+              <a:ext cx="4614120" cy="61200"/>
+            </p14:xfrm>
+          </p:contentPart>
+        </mc:Choice>
+        <mc:Fallback>
+          <p:pic>
+            <p:nvPicPr>
+              <p:cNvPr id="9" name="Ink 8">
+                <a:extLst>
+                  <a:ext uri="{FF2B5EF4-FFF2-40B4-BE49-F238E27FC236}">
+                    <a16:creationId xmlns:a16="http://schemas.microsoft.com/office/drawing/2014/main" id="{BDED0134-4FC0-23F3-B891-DC34C9A292A9}"/>
+                  </a:ext>
+                </a:extLst>
+              </p:cNvPr>
+              <p:cNvPicPr/>
+              <p:nvPr/>
+            </p:nvPicPr>
+            <p:blipFill>
+              <a:blip r:embed="rId11"/>
+              <a:stretch>
+                <a:fillRect/>
+              </a:stretch>
+            </p:blipFill>
+            <p:spPr>
+              <a:xfrm>
+                <a:off x="642424" y="5588891"/>
+                <a:ext cx="4631760" cy="78840"/>
+              </a:xfrm>
+              <a:prstGeom prst="rect">
+                <a:avLst/>
+              </a:prstGeom>
+            </p:spPr>
+          </p:pic>
+        </mc:Fallback>
+      </mc:AlternateContent>
+      <p:grpSp>
+        <p:nvGrpSpPr>
+          <p:cNvPr id="15" name="Group 14">
+            <a:extLst>
+              <a:ext uri="{FF2B5EF4-FFF2-40B4-BE49-F238E27FC236}">
+                <a16:creationId xmlns:a16="http://schemas.microsoft.com/office/drawing/2014/main" id="{6773B1EB-1A3F-8976-202F-BD99DBE0C254}"/>
+              </a:ext>
+            </a:extLst>
+          </p:cNvPr>
+          <p:cNvGrpSpPr/>
+          <p:nvPr/>
+        </p:nvGrpSpPr>
+        <p:grpSpPr>
+          <a:xfrm>
+            <a:off x="5543824" y="2473811"/>
+            <a:ext cx="891360" cy="2621520"/>
+            <a:chOff x="5543824" y="2473811"/>
+            <a:chExt cx="891360" cy="2621520"/>
+          </a:xfrm>
+        </p:grpSpPr>
+        <mc:AlternateContent xmlns:mc="http://schemas.openxmlformats.org/markup-compatibility/2006">
+          <mc:Choice xmlns:p14="http://schemas.microsoft.com/office/powerpoint/2010/main" Requires="p14">
+            <p:contentPart p14:bwMode="auto" r:id="rId12">
+              <p14:nvContentPartPr>
+                <p14:cNvPr id="10" name="Ink 9">
+                  <a:extLst>
+                    <a:ext uri="{FF2B5EF4-FFF2-40B4-BE49-F238E27FC236}">
+                      <a16:creationId xmlns:a16="http://schemas.microsoft.com/office/drawing/2014/main" id="{6591A42F-E0A5-C0EE-C2D2-4B11AA213F91}"/>
+                    </a:ext>
+                  </a:extLst>
+                </p14:cNvPr>
+                <p14:cNvContentPartPr/>
+                <p14:nvPr/>
+              </p14:nvContentPartPr>
+              <p14:xfrm>
+                <a:off x="5543824" y="2505491"/>
+                <a:ext cx="835920" cy="2589840"/>
+              </p14:xfrm>
+            </p:contentPart>
+          </mc:Choice>
+          <mc:Fallback>
+            <p:pic>
+              <p:nvPicPr>
+                <p:cNvPr id="10" name="Ink 9">
+                  <a:extLst>
+                    <a:ext uri="{FF2B5EF4-FFF2-40B4-BE49-F238E27FC236}">
+                      <a16:creationId xmlns:a16="http://schemas.microsoft.com/office/drawing/2014/main" id="{6591A42F-E0A5-C0EE-C2D2-4B11AA213F91}"/>
+                    </a:ext>
+                  </a:extLst>
+                </p:cNvPr>
+                <p:cNvPicPr/>
+                <p:nvPr/>
+              </p:nvPicPr>
+              <p:blipFill>
+                <a:blip r:embed="rId13"/>
+                <a:stretch>
+                  <a:fillRect/>
+                </a:stretch>
+              </p:blipFill>
+              <p:spPr>
+                <a:xfrm>
+                  <a:off x="5534824" y="2496851"/>
+                  <a:ext cx="853560" cy="2607480"/>
+                </a:xfrm>
+                <a:prstGeom prst="rect">
+                  <a:avLst/>
+                </a:prstGeom>
+              </p:spPr>
+            </p:pic>
+          </mc:Fallback>
+        </mc:AlternateContent>
+        <mc:AlternateContent xmlns:mc="http://schemas.openxmlformats.org/markup-compatibility/2006">
+          <mc:Choice xmlns:p14="http://schemas.microsoft.com/office/powerpoint/2010/main" Requires="p14">
+            <p:contentPart p14:bwMode="auto" r:id="rId14">
+              <p14:nvContentPartPr>
+                <p14:cNvPr id="13" name="Ink 12">
+                  <a:extLst>
+                    <a:ext uri="{FF2B5EF4-FFF2-40B4-BE49-F238E27FC236}">
+                      <a16:creationId xmlns:a16="http://schemas.microsoft.com/office/drawing/2014/main" id="{E490CE3E-45B3-B194-B1C2-6FE00BCBAADB}"/>
+                    </a:ext>
+                  </a:extLst>
+                </p14:cNvPr>
+                <p14:cNvContentPartPr/>
+                <p14:nvPr/>
+              </p14:nvContentPartPr>
+              <p14:xfrm>
+                <a:off x="6310984" y="2473811"/>
+                <a:ext cx="124200" cy="150840"/>
+              </p14:xfrm>
+            </p:contentPart>
+          </mc:Choice>
+          <mc:Fallback>
+            <p:pic>
+              <p:nvPicPr>
+                <p:cNvPr id="13" name="Ink 12">
+                  <a:extLst>
+                    <a:ext uri="{FF2B5EF4-FFF2-40B4-BE49-F238E27FC236}">
+                      <a16:creationId xmlns:a16="http://schemas.microsoft.com/office/drawing/2014/main" id="{E490CE3E-45B3-B194-B1C2-6FE00BCBAADB}"/>
+                    </a:ext>
+                  </a:extLst>
+                </p:cNvPr>
+                <p:cNvPicPr/>
+                <p:nvPr/>
+              </p:nvPicPr>
+              <p:blipFill>
+                <a:blip r:embed="rId15"/>
+                <a:stretch>
+                  <a:fillRect/>
+                </a:stretch>
+              </p:blipFill>
+              <p:spPr>
+                <a:xfrm>
+                  <a:off x="6302344" y="2465171"/>
+                  <a:ext cx="141840" cy="168480"/>
+                </a:xfrm>
+                <a:prstGeom prst="rect">
+                  <a:avLst/>
+                </a:prstGeom>
+              </p:spPr>
+            </p:pic>
+          </mc:Fallback>
+        </mc:AlternateContent>
+      </p:grpSp>
     </p:spTree>
     <p:extLst>
       <p:ext uri="{BB962C8B-B14F-4D97-AF65-F5344CB8AC3E}">
         <p14:creationId xmlns:p14="http://schemas.microsoft.com/office/powerpoint/2010/main" val="1614108837"/>
+      </p:ext>
+    </p:extLst>
+  </p:cSld>
+  <p:clrMapOvr>
+    <a:masterClrMapping/>
+  </p:clrMapOvr>
+</p:sld>
+</file>
+
+<file path=ppt/slides/slide4.xml><?xml version="1.0" encoding="utf-8"?>
+<p:sld xmlns:a="http://schemas.openxmlformats.org/drawingml/2006/main" xmlns:r="http://schemas.openxmlformats.org/officeDocument/2006/relationships" xmlns:p="http://schemas.openxmlformats.org/presentationml/2006/main">
+  <p:cSld>
+    <p:spTree>
+      <p:nvGrpSpPr>
+        <p:cNvPr id="1" name=""/>
+        <p:cNvGrpSpPr/>
+        <p:nvPr/>
+      </p:nvGrpSpPr>
+      <p:grpSpPr>
+        <a:xfrm>
+          <a:off x="0" y="0"/>
+          <a:ext cx="0" cy="0"/>
+          <a:chOff x="0" y="0"/>
+          <a:chExt cx="0" cy="0"/>
+        </a:xfrm>
+      </p:grpSpPr>
+      <p:sp>
+        <p:nvSpPr>
+          <p:cNvPr id="2" name="Title 1">
+            <a:extLst>
+              <a:ext uri="{FF2B5EF4-FFF2-40B4-BE49-F238E27FC236}">
+                <a16:creationId xmlns:a16="http://schemas.microsoft.com/office/drawing/2014/main" id="{36F87DA9-EDC3-B4C2-EDC7-0C11C16A093B}"/>
+              </a:ext>
+            </a:extLst>
+          </p:cNvPr>
+          <p:cNvSpPr>
+            <a:spLocks noGrp="1"/>
+          </p:cNvSpPr>
+          <p:nvPr>
+            <p:ph type="title"/>
+          </p:nvPr>
+        </p:nvSpPr>
+        <p:spPr/>
+        <p:txBody>
+          <a:bodyPr/>
+          <a:lstStyle/>
+          <a:p>
+            <a:r>
+              <a:rPr lang="en-SK" dirty="0"/>
+              <a:t>RooCode interpreting Mut report</a:t>
+            </a:r>
+          </a:p>
+        </p:txBody>
+      </p:sp>
+      <mc:AlternateContent xmlns:mc="http://schemas.openxmlformats.org/markup-compatibility/2006">
+        <mc:Choice xmlns:p14="http://schemas.microsoft.com/office/powerpoint/2010/main" Requires="p14">
+          <p:contentPart p14:bwMode="auto" r:id="rId2">
+            <p14:nvContentPartPr>
+              <p14:cNvPr id="4" name="Ink 3">
+                <a:extLst>
+                  <a:ext uri="{FF2B5EF4-FFF2-40B4-BE49-F238E27FC236}">
+                    <a16:creationId xmlns:a16="http://schemas.microsoft.com/office/drawing/2014/main" id="{907E1AA7-D44F-D243-BE1F-9FB71C6145FF}"/>
+                  </a:ext>
+                </a:extLst>
+              </p14:cNvPr>
+              <p14:cNvContentPartPr/>
+              <p14:nvPr/>
+            </p14:nvContentPartPr>
+            <p14:xfrm>
+              <a:off x="1762024" y="1407491"/>
+              <a:ext cx="360" cy="360"/>
+            </p14:xfrm>
+          </p:contentPart>
+        </mc:Choice>
+        <mc:Fallback>
+          <p:pic>
+            <p:nvPicPr>
+              <p:cNvPr id="4" name="Ink 3">
+                <a:extLst>
+                  <a:ext uri="{FF2B5EF4-FFF2-40B4-BE49-F238E27FC236}">
+                    <a16:creationId xmlns:a16="http://schemas.microsoft.com/office/drawing/2014/main" id="{907E1AA7-D44F-D243-BE1F-9FB71C6145FF}"/>
+                  </a:ext>
+                </a:extLst>
+              </p:cNvPr>
+              <p:cNvPicPr/>
+              <p:nvPr/>
+            </p:nvPicPr>
+            <p:blipFill>
+              <a:blip r:embed="rId3"/>
+              <a:stretch>
+                <a:fillRect/>
+              </a:stretch>
+            </p:blipFill>
+            <p:spPr>
+              <a:xfrm>
+                <a:off x="1753384" y="1398491"/>
+                <a:ext cx="18000" cy="18000"/>
+              </a:xfrm>
+              <a:prstGeom prst="rect">
+                <a:avLst/>
+              </a:prstGeom>
+            </p:spPr>
+          </p:pic>
+        </mc:Fallback>
+      </mc:AlternateContent>
+      <mc:AlternateContent xmlns:mc="http://schemas.openxmlformats.org/markup-compatibility/2006">
+        <mc:Choice xmlns:p14="http://schemas.microsoft.com/office/powerpoint/2010/main" Requires="p14">
+          <p:contentPart p14:bwMode="auto" r:id="rId4">
+            <p14:nvContentPartPr>
+              <p14:cNvPr id="5" name="Ink 4">
+                <a:extLst>
+                  <a:ext uri="{FF2B5EF4-FFF2-40B4-BE49-F238E27FC236}">
+                    <a16:creationId xmlns:a16="http://schemas.microsoft.com/office/drawing/2014/main" id="{AA81E732-DBF9-71C1-F30F-D82FDD4F8E90}"/>
+                  </a:ext>
+                </a:extLst>
+              </p14:cNvPr>
+              <p14:cNvContentPartPr/>
+              <p14:nvPr/>
+            </p14:nvContentPartPr>
+            <p14:xfrm>
+              <a:off x="1234264" y="1055771"/>
+              <a:ext cx="360" cy="360"/>
+            </p14:xfrm>
+          </p:contentPart>
+        </mc:Choice>
+        <mc:Fallback>
+          <p:pic>
+            <p:nvPicPr>
+              <p:cNvPr id="5" name="Ink 4">
+                <a:extLst>
+                  <a:ext uri="{FF2B5EF4-FFF2-40B4-BE49-F238E27FC236}">
+                    <a16:creationId xmlns:a16="http://schemas.microsoft.com/office/drawing/2014/main" id="{AA81E732-DBF9-71C1-F30F-D82FDD4F8E90}"/>
+                  </a:ext>
+                </a:extLst>
+              </p:cNvPr>
+              <p:cNvPicPr/>
+              <p:nvPr/>
+            </p:nvPicPr>
+            <p:blipFill>
+              <a:blip r:embed="rId3"/>
+              <a:stretch>
+                <a:fillRect/>
+              </a:stretch>
+            </p:blipFill>
+            <p:spPr>
+              <a:xfrm>
+                <a:off x="1225264" y="1047131"/>
+                <a:ext cx="18000" cy="18000"/>
+              </a:xfrm>
+              <a:prstGeom prst="rect">
+                <a:avLst/>
+              </a:prstGeom>
+            </p:spPr>
+          </p:pic>
+        </mc:Fallback>
+      </mc:AlternateContent>
+      <p:pic>
+        <p:nvPicPr>
+          <p:cNvPr id="6" name="Picture 5">
+            <a:extLst>
+              <a:ext uri="{FF2B5EF4-FFF2-40B4-BE49-F238E27FC236}">
+                <a16:creationId xmlns:a16="http://schemas.microsoft.com/office/drawing/2014/main" id="{075E913D-560F-4C8A-F72E-DA497C693C2A}"/>
+              </a:ext>
+            </a:extLst>
+          </p:cNvPr>
+          <p:cNvPicPr>
+            <a:picLocks noChangeAspect="1"/>
+          </p:cNvPicPr>
+          <p:nvPr/>
+        </p:nvPicPr>
+        <p:blipFill>
+          <a:blip r:embed="rId5"/>
+          <a:stretch>
+            <a:fillRect/>
+          </a:stretch>
+        </p:blipFill>
+        <p:spPr>
+          <a:xfrm>
+            <a:off x="838200" y="1690688"/>
+            <a:ext cx="7239000" cy="4559300"/>
+          </a:xfrm>
+          <a:prstGeom prst="rect">
+            <a:avLst/>
+          </a:prstGeom>
+        </p:spPr>
+      </p:pic>
+      <p:pic>
+        <p:nvPicPr>
+          <p:cNvPr id="11" name="Picture 10">
+            <a:extLst>
+              <a:ext uri="{FF2B5EF4-FFF2-40B4-BE49-F238E27FC236}">
+                <a16:creationId xmlns:a16="http://schemas.microsoft.com/office/drawing/2014/main" id="{296C493E-A3B0-F808-4594-C32ECAB336B1}"/>
+              </a:ext>
+            </a:extLst>
+          </p:cNvPr>
+          <p:cNvPicPr>
+            <a:picLocks noChangeAspect="1"/>
+          </p:cNvPicPr>
+          <p:nvPr/>
+        </p:nvPicPr>
+        <p:blipFill>
+          <a:blip r:embed="rId6"/>
+          <a:stretch>
+            <a:fillRect/>
+          </a:stretch>
+        </p:blipFill>
+        <p:spPr>
+          <a:xfrm>
+            <a:off x="8377853" y="379110"/>
+            <a:ext cx="3643212" cy="6113765"/>
+          </a:xfrm>
+          <a:prstGeom prst="rect">
+            <a:avLst/>
+          </a:prstGeom>
+        </p:spPr>
+      </p:pic>
+    </p:spTree>
+    <p:extLst>
+      <p:ext uri="{BB962C8B-B14F-4D97-AF65-F5344CB8AC3E}">
+        <p14:creationId xmlns:p14="http://schemas.microsoft.com/office/powerpoint/2010/main" val="567124808"/>
       </p:ext>
     </p:extLst>
   </p:cSld>

</xml_diff>

<commit_message>
Documenting my hunting evening
</commit_message>
<xml_diff>
--- a/_spikes/stryker-playground/Stryker-demo.pptx
+++ b/_spikes/stryker-playground/Stryker-demo.pptx
@@ -3803,8 +3803,47 @@
               <a:t>2) test je nanic a nepokryva podstatnu cast kodu</a:t>
             </a:r>
           </a:p>
-        </p:txBody>
-      </p:sp>
+          <a:p>
+            <a:r>
+              <a:rPr lang="en-SK"/>
+              <a:t>3) ani diva svina (zatial nevie) alebo je to na exclude</a:t>
+            </a:r>
+          </a:p>
+          <a:p>
+            <a:endParaRPr lang="en-SK" dirty="0"/>
+          </a:p>
+        </p:txBody>
+      </p:sp>
+      <p:pic>
+        <p:nvPicPr>
+          <p:cNvPr id="4" name="Picture 3">
+            <a:extLst>
+              <a:ext uri="{FF2B5EF4-FFF2-40B4-BE49-F238E27FC236}">
+                <a16:creationId xmlns:a16="http://schemas.microsoft.com/office/drawing/2014/main" id="{A1666D00-0B14-03FB-8B87-FF69BF08C4A4}"/>
+              </a:ext>
+            </a:extLst>
+          </p:cNvPr>
+          <p:cNvPicPr>
+            <a:picLocks noChangeAspect="1"/>
+          </p:cNvPicPr>
+          <p:nvPr/>
+        </p:nvPicPr>
+        <p:blipFill>
+          <a:blip r:embed="rId2"/>
+          <a:stretch>
+            <a:fillRect/>
+          </a:stretch>
+        </p:blipFill>
+        <p:spPr>
+          <a:xfrm>
+            <a:off x="949411" y="3443703"/>
+            <a:ext cx="7772400" cy="3049172"/>
+          </a:xfrm>
+          <a:prstGeom prst="rect">
+            <a:avLst/>
+          </a:prstGeom>
+        </p:spPr>
+      </p:pic>
     </p:spTree>
     <p:extLst>
       <p:ext uri="{BB962C8B-B14F-4D97-AF65-F5344CB8AC3E}">

</xml_diff>